<commit_message>
all subs split for labels
</commit_message>
<xml_diff>
--- a/analysis/output/results/MVPA_ACC_02242020.pptx
+++ b/analysis/output/results/MVPA_ACC_02242020.pptx
@@ -5907,7 +5907,7 @@
           <a:p>
             <a:r>
               <a:rPr lang="en-US" dirty="0"/>
-              <a:t>Train all task and rest one subject test all task and rest other subject</a:t>
+              <a:t>What if you used all the tasks in the training and testing set</a:t>
             </a:r>
             <a:br>
               <a:rPr lang="en-US" dirty="0"/>
@@ -5938,8 +5938,173 @@
         </p:blipFill>
         <p:spPr>
           <a:xfrm>
-            <a:off x="4766210" y="1690688"/>
-            <a:ext cx="6587590" cy="4564498"/>
+            <a:off x="4355244" y="1582221"/>
+            <a:ext cx="3793380" cy="2628408"/>
+          </a:xfrm>
+          <a:prstGeom prst="rect">
+            <a:avLst/>
+          </a:prstGeom>
+        </p:spPr>
+      </p:pic>
+      <p:sp>
+        <p:nvSpPr>
+          <p:cNvPr id="3" name="TextBox 2">
+            <a:extLst>
+              <a:ext uri="{FF2B5EF4-FFF2-40B4-BE49-F238E27FC236}">
+                <a16:creationId xmlns:a16="http://schemas.microsoft.com/office/drawing/2014/main" id="{C9CC1C12-F534-F94E-8E01-E6889A266D0F}"/>
+              </a:ext>
+            </a:extLst>
+          </p:cNvPr>
+          <p:cNvSpPr txBox="1"/>
+          <p:nvPr/>
+        </p:nvSpPr>
+        <p:spPr>
+          <a:xfrm>
+            <a:off x="6020656" y="1212351"/>
+            <a:ext cx="891462" cy="369332"/>
+          </a:xfrm>
+          <a:prstGeom prst="rect">
+            <a:avLst/>
+          </a:prstGeom>
+          <a:noFill/>
+        </p:spPr>
+        <p:txBody>
+          <a:bodyPr wrap="none" rtlCol="0">
+            <a:spAutoFit/>
+          </a:bodyPr>
+          <a:lstStyle/>
+          <a:p>
+            <a:r>
+              <a:rPr lang="en-US" dirty="0"/>
+              <a:t>All data</a:t>
+            </a:r>
+          </a:p>
+        </p:txBody>
+      </p:sp>
+      <p:sp>
+        <p:nvSpPr>
+          <p:cNvPr id="4" name="TextBox 3">
+            <a:extLst>
+              <a:ext uri="{FF2B5EF4-FFF2-40B4-BE49-F238E27FC236}">
+                <a16:creationId xmlns:a16="http://schemas.microsoft.com/office/drawing/2014/main" id="{4CD72D38-EC47-A14E-9A1B-DE0ACEC18C97}"/>
+              </a:ext>
+            </a:extLst>
+          </p:cNvPr>
+          <p:cNvSpPr txBox="1"/>
+          <p:nvPr/>
+        </p:nvSpPr>
+        <p:spPr>
+          <a:xfrm>
+            <a:off x="1853667" y="3300472"/>
+            <a:ext cx="965771" cy="369332"/>
+          </a:xfrm>
+          <a:prstGeom prst="rect">
+            <a:avLst/>
+          </a:prstGeom>
+          <a:noFill/>
+        </p:spPr>
+        <p:txBody>
+          <a:bodyPr wrap="square" rtlCol="0">
+            <a:spAutoFit/>
+          </a:bodyPr>
+          <a:lstStyle/>
+          <a:p>
+            <a:r>
+              <a:rPr lang="en-US" dirty="0"/>
+              <a:t>Task</a:t>
+            </a:r>
+          </a:p>
+        </p:txBody>
+      </p:sp>
+      <p:sp>
+        <p:nvSpPr>
+          <p:cNvPr id="6" name="TextBox 5">
+            <a:extLst>
+              <a:ext uri="{FF2B5EF4-FFF2-40B4-BE49-F238E27FC236}">
+                <a16:creationId xmlns:a16="http://schemas.microsoft.com/office/drawing/2014/main" id="{A37F6959-5893-2E41-AB12-53F92F4DF2A5}"/>
+              </a:ext>
+            </a:extLst>
+          </p:cNvPr>
+          <p:cNvSpPr txBox="1"/>
+          <p:nvPr/>
+        </p:nvSpPr>
+        <p:spPr>
+          <a:xfrm>
+            <a:off x="10233062" y="3300472"/>
+            <a:ext cx="585225" cy="369332"/>
+          </a:xfrm>
+          <a:prstGeom prst="rect">
+            <a:avLst/>
+          </a:prstGeom>
+          <a:noFill/>
+        </p:spPr>
+        <p:txBody>
+          <a:bodyPr wrap="none" rtlCol="0">
+            <a:spAutoFit/>
+          </a:bodyPr>
+          <a:lstStyle/>
+          <a:p>
+            <a:r>
+              <a:rPr lang="en-US" dirty="0"/>
+              <a:t>Rest</a:t>
+            </a:r>
+          </a:p>
+        </p:txBody>
+      </p:sp>
+      <p:pic>
+        <p:nvPicPr>
+          <p:cNvPr id="8" name="Picture 7">
+            <a:extLst>
+              <a:ext uri="{FF2B5EF4-FFF2-40B4-BE49-F238E27FC236}">
+                <a16:creationId xmlns:a16="http://schemas.microsoft.com/office/drawing/2014/main" id="{DF4212B5-FBD4-684B-B81E-1715D5502DC3}"/>
+              </a:ext>
+            </a:extLst>
+          </p:cNvPr>
+          <p:cNvPicPr>
+            <a:picLocks noChangeAspect="1"/>
+          </p:cNvPicPr>
+          <p:nvPr/>
+        </p:nvPicPr>
+        <p:blipFill>
+          <a:blip r:embed="rId3"/>
+          <a:stretch>
+            <a:fillRect/>
+          </a:stretch>
+        </p:blipFill>
+        <p:spPr>
+          <a:xfrm>
+            <a:off x="293045" y="3669804"/>
+            <a:ext cx="3791138" cy="2665343"/>
+          </a:xfrm>
+          <a:prstGeom prst="rect">
+            <a:avLst/>
+          </a:prstGeom>
+        </p:spPr>
+      </p:pic>
+      <p:pic>
+        <p:nvPicPr>
+          <p:cNvPr id="10" name="Picture 9">
+            <a:extLst>
+              <a:ext uri="{FF2B5EF4-FFF2-40B4-BE49-F238E27FC236}">
+                <a16:creationId xmlns:a16="http://schemas.microsoft.com/office/drawing/2014/main" id="{F6B40404-48B0-6F4E-95B8-2E8A3E77F7C2}"/>
+              </a:ext>
+            </a:extLst>
+          </p:cNvPr>
+          <p:cNvPicPr>
+            <a:picLocks noChangeAspect="1"/>
+          </p:cNvPicPr>
+          <p:nvPr/>
+        </p:nvPicPr>
+        <p:blipFill>
+          <a:blip r:embed="rId4"/>
+          <a:stretch>
+            <a:fillRect/>
+          </a:stretch>
+        </p:blipFill>
+        <p:spPr>
+          <a:xfrm>
+            <a:off x="8258774" y="3821986"/>
+            <a:ext cx="3786113" cy="2663940"/>
           </a:xfrm>
           <a:prstGeom prst="rect">
             <a:avLst/>

</xml_diff>